<commit_message>
Cambios Práctica 1 y ppt
</commit_message>
<xml_diff>
--- a/Mod 2 - Intro a programacion/Clase 1 - Intro a R/Presentacion Intro R y RStudio.pptx
+++ b/Mod 2 - Intro a programacion/Clase 1 - Intro a R/Presentacion Intro R y RStudio.pptx
@@ -5,24 +5,23 @@
     <p:sldMasterId id="2147483659" r:id="rId4"/>
   </p:sldMasterIdLst>
   <p:notesMasterIdLst>
-    <p:notesMasterId r:id="rId10"/>
+    <p:notesMasterId r:id="rId9"/>
   </p:notesMasterIdLst>
   <p:sldIdLst>
     <p:sldId id="256" r:id="rId5"/>
     <p:sldId id="275" r:id="rId6"/>
     <p:sldId id="277" r:id="rId7"/>
     <p:sldId id="278" r:id="rId8"/>
-    <p:sldId id="279" r:id="rId9"/>
   </p:sldIdLst>
   <p:sldSz cx="9144000" cy="6858000" type="screen4x3"/>
   <p:notesSz cx="6858000" cy="9144000"/>
   <p:embeddedFontLst>
     <p:embeddedFont>
       <p:font typeface="Garamond" panose="02020404030301010803" pitchFamily="18" charset="0"/>
-      <p:regular r:id="rId11"/>
-      <p:bold r:id="rId12"/>
-      <p:italic r:id="rId13"/>
-      <p:boldItalic r:id="rId14"/>
+      <p:regular r:id="rId10"/>
+      <p:bold r:id="rId11"/>
+      <p:italic r:id="rId12"/>
+      <p:boldItalic r:id="rId13"/>
     </p:embeddedFont>
   </p:embeddedFontLst>
   <p:defaultTextStyle>
@@ -11121,7 +11120,7 @@
             </a:r>
             <a:r>
               <a:rPr lang="es-AR" sz="2000" dirty="0"/>
-              <a:t>, también en formato HTML, con ejercicios</a:t>
+              <a:t>, también en formato HTML, con ejercicios y sus respuestas</a:t>
             </a:r>
           </a:p>
         </p:txBody>
@@ -11286,126 +11285,6 @@
     <p:extLst>
       <p:ext uri="{BB962C8B-B14F-4D97-AF65-F5344CB8AC3E}">
         <p14:creationId xmlns:p14="http://schemas.microsoft.com/office/powerpoint/2010/main" val="1659907925"/>
-      </p:ext>
-    </p:extLst>
-  </p:cSld>
-  <p:clrMapOvr>
-    <a:masterClrMapping/>
-  </p:clrMapOvr>
-</p:sld>
-</file>
-
-<file path=ppt/slides/slide5.xml><?xml version="1.0" encoding="utf-8"?>
-<p:sld xmlns:a="http://schemas.openxmlformats.org/drawingml/2006/main" xmlns:r="http://schemas.openxmlformats.org/officeDocument/2006/relationships" xmlns:p="http://schemas.openxmlformats.org/presentationml/2006/main">
-  <p:cSld>
-    <p:spTree>
-      <p:nvGrpSpPr>
-        <p:cNvPr id="1" name="">
-          <a:extLst>
-            <a:ext uri="{FF2B5EF4-FFF2-40B4-BE49-F238E27FC236}">
-              <a16:creationId xmlns:a16="http://schemas.microsoft.com/office/drawing/2014/main" id="{5B7D7234-BB77-2A81-C61A-EFCEE8BCFB32}"/>
-            </a:ext>
-          </a:extLst>
-        </p:cNvPr>
-        <p:cNvGrpSpPr/>
-        <p:nvPr/>
-      </p:nvGrpSpPr>
-      <p:grpSpPr>
-        <a:xfrm>
-          <a:off x="0" y="0"/>
-          <a:ext cx="0" cy="0"/>
-          <a:chOff x="0" y="0"/>
-          <a:chExt cx="0" cy="0"/>
-        </a:xfrm>
-      </p:grpSpPr>
-      <p:sp>
-        <p:nvSpPr>
-          <p:cNvPr id="2" name="Title 1">
-            <a:extLst>
-              <a:ext uri="{FF2B5EF4-FFF2-40B4-BE49-F238E27FC236}">
-                <a16:creationId xmlns:a16="http://schemas.microsoft.com/office/drawing/2014/main" id="{23542EAD-D107-67DB-5F07-8FAC6A6CB7FC}"/>
-              </a:ext>
-            </a:extLst>
-          </p:cNvPr>
-          <p:cNvSpPr>
-            <a:spLocks noGrp="1"/>
-          </p:cNvSpPr>
-          <p:nvPr>
-            <p:ph type="title"/>
-          </p:nvPr>
-        </p:nvSpPr>
-        <p:spPr/>
-        <p:txBody>
-          <a:bodyPr>
-            <a:normAutofit fontScale="90000"/>
-          </a:bodyPr>
-          <a:lstStyle/>
-          <a:p>
-            <a:pPr>
-              <a:lnSpc>
-                <a:spcPct val="150000"/>
-              </a:lnSpc>
-            </a:pPr>
-            <a:r>
-              <a:rPr lang="es-AR" sz="4400" dirty="0"/>
-              <a:t>Sobre el uso de la inteligencia artificial</a:t>
-            </a:r>
-          </a:p>
-        </p:txBody>
-      </p:sp>
-      <p:sp>
-        <p:nvSpPr>
-          <p:cNvPr id="3" name="Content Placeholder 2">
-            <a:extLst>
-              <a:ext uri="{FF2B5EF4-FFF2-40B4-BE49-F238E27FC236}">
-                <a16:creationId xmlns:a16="http://schemas.microsoft.com/office/drawing/2014/main" id="{E1E2E2C6-CFBF-D116-63E5-13CB5D32BF73}"/>
-              </a:ext>
-            </a:extLst>
-          </p:cNvPr>
-          <p:cNvSpPr>
-            <a:spLocks noGrp="1"/>
-          </p:cNvSpPr>
-          <p:nvPr>
-            <p:ph idx="1"/>
-          </p:nvPr>
-        </p:nvSpPr>
-        <p:spPr>
-          <a:noFill/>
-          <a:ln>
-            <a:noFill/>
-          </a:ln>
-        </p:spPr>
-        <p:txBody>
-          <a:bodyPr spcFirstLastPara="1" wrap="square" lIns="91425" tIns="45700" rIns="91425" bIns="45700" anchor="t" anchorCtr="0">
-            <a:normAutofit/>
-          </a:bodyPr>
-          <a:lstStyle/>
-          <a:p>
-            <a:pPr>
-              <a:lnSpc>
-                <a:spcPct val="150000"/>
-              </a:lnSpc>
-            </a:pPr>
-            <a:r>
-              <a:rPr lang="es-ES" sz="2000" dirty="0"/>
-              <a:t>El uso más productivo de la inteligencia artificial es a partir del conocimiento conceptual de la herramienta. Saber sintaxis, conocer las funciones y las potencialidades de cada lenguaje. Estamos muy a favor de usar </a:t>
-            </a:r>
-            <a:r>
-              <a:rPr lang="es-ES" sz="2000" dirty="0" err="1"/>
-              <a:t>chatgpt</a:t>
-            </a:r>
-            <a:r>
-              <a:rPr lang="es-ES" sz="2000" dirty="0"/>
-              <a:t> y similares, pero les recomendamos no usarlo en el curso. En todo caso, pueden pasarle un código para que les señale errores o les de alguna pista de como resolver algo. </a:t>
-            </a:r>
-            <a:endParaRPr lang="es-AR" sz="1200" dirty="0"/>
-          </a:p>
-        </p:txBody>
-      </p:sp>
-    </p:spTree>
-    <p:extLst>
-      <p:ext uri="{BB962C8B-B14F-4D97-AF65-F5344CB8AC3E}">
-        <p14:creationId xmlns:p14="http://schemas.microsoft.com/office/powerpoint/2010/main" val="2720236320"/>
       </p:ext>
     </p:extLst>
   </p:cSld>
@@ -11978,12 +11857,6 @@
 </file>
 
 <file path=customXml/item1.xml><?xml version="1.0" encoding="utf-8"?>
-<p:properties xmlns:p="http://schemas.microsoft.com/office/2006/metadata/properties" xmlns:xsi="http://www.w3.org/2001/XMLSchema-instance" xmlns:pc="http://schemas.microsoft.com/office/infopath/2007/PartnerControls">
-  <documentManagement/>
-</p:properties>
-</file>
-
-<file path=customXml/item2.xml><?xml version="1.0" encoding="utf-8"?>
 <ct:contentTypeSchema xmlns:ct="http://schemas.microsoft.com/office/2006/metadata/contentType" xmlns:ma="http://schemas.microsoft.com/office/2006/metadata/properties/metaAttributes" ct:_="" ma:_="" ma:contentTypeName="Documento" ma:contentTypeID="0x0101008012B7978306E74CBD574D876E1FD2B9" ma:contentTypeVersion="7" ma:contentTypeDescription="Crear nuevo documento." ma:contentTypeScope="" ma:versionID="7b1a18675cde8746c6df6e4a6909ab99">
   <xsd:schema xmlns:xsd="http://www.w3.org/2001/XMLSchema" xmlns:xs="http://www.w3.org/2001/XMLSchema" xmlns:p="http://schemas.microsoft.com/office/2006/metadata/properties" xmlns:ns2="6e8d534b-33df-4b44-9bc3-29e2dd1a81c6" targetNamespace="http://schemas.microsoft.com/office/2006/metadata/properties" ma:root="true" ma:fieldsID="ee020865892c92be3310f65b980f8dde" ns2:_="">
     <xsd:import namespace="6e8d534b-33df-4b44-9bc3-29e2dd1a81c6"/>
@@ -12145,6 +12018,12 @@
 </ct:contentTypeSchema>
 </file>
 
+<file path=customXml/item2.xml><?xml version="1.0" encoding="utf-8"?>
+<p:properties xmlns:p="http://schemas.microsoft.com/office/2006/metadata/properties" xmlns:xsi="http://www.w3.org/2001/XMLSchema-instance" xmlns:pc="http://schemas.microsoft.com/office/infopath/2007/PartnerControls">
+  <documentManagement/>
+</p:properties>
+</file>
+
 <file path=customXml/item3.xml><?xml version="1.0" encoding="utf-8"?>
 <?mso-contentType ?>
 <FormTemplates xmlns="http://schemas.microsoft.com/sharepoint/v3/contenttype/forms">
@@ -12155,15 +12034,6 @@
 </file>
 
 <file path=customXml/itemProps1.xml><?xml version="1.0" encoding="utf-8"?>
-<ds:datastoreItem xmlns:ds="http://schemas.openxmlformats.org/officeDocument/2006/customXml" ds:itemID="{07EEB74B-51DE-4C01-8C9B-6F00E0936021}">
-  <ds:schemaRefs>
-    <ds:schemaRef ds:uri="http://schemas.microsoft.com/office/2006/metadata/properties"/>
-    <ds:schemaRef ds:uri="http://schemas.microsoft.com/office/infopath/2007/PartnerControls"/>
-  </ds:schemaRefs>
-</ds:datastoreItem>
-</file>
-
-<file path=customXml/itemProps2.xml><?xml version="1.0" encoding="utf-8"?>
 <ds:datastoreItem xmlns:ds="http://schemas.openxmlformats.org/officeDocument/2006/customXml" ds:itemID="{F8585859-2678-466A-ABE1-0A6462391516}">
   <ds:schemaRefs>
     <ds:schemaRef ds:uri="http://schemas.microsoft.com/office/2006/metadata/contentType"/>
@@ -12181,6 +12051,15 @@
 </ds:datastoreItem>
 </file>
 
+<file path=customXml/itemProps2.xml><?xml version="1.0" encoding="utf-8"?>
+<ds:datastoreItem xmlns:ds="http://schemas.openxmlformats.org/officeDocument/2006/customXml" ds:itemID="{07EEB74B-51DE-4C01-8C9B-6F00E0936021}">
+  <ds:schemaRefs>
+    <ds:schemaRef ds:uri="http://schemas.microsoft.com/office/2006/metadata/properties"/>
+    <ds:schemaRef ds:uri="http://schemas.microsoft.com/office/infopath/2007/PartnerControls"/>
+  </ds:schemaRefs>
+</ds:datastoreItem>
+</file>
+
 <file path=customXml/itemProps3.xml><?xml version="1.0" encoding="utf-8"?>
 <ds:datastoreItem xmlns:ds="http://schemas.openxmlformats.org/officeDocument/2006/customXml" ds:itemID="{FC4F76F4-EE10-424A-BA03-EF382FF74113}">
   <ds:schemaRefs>

</xml_diff>